<commit_message>
stopped at error on H1, bigsearch
</commit_message>
<xml_diff>
--- a/searchmazes.pptx
+++ b/searchmazes.pptx
@@ -8,6 +8,7 @@
     <p:sldId id="256" r:id="rId2"/>
     <p:sldId id="257" r:id="rId3"/>
     <p:sldId id="258" r:id="rId4"/>
+    <p:sldId id="259" r:id="rId5"/>
   </p:sldIdLst>
   <p:sldSz cx="9144000" cy="6858000" type="screen4x3"/>
   <p:notesSz cx="6858000" cy="9144000"/>
@@ -4149,11 +4150,6 @@
                   </a:rPr>
                   <a:t>P</a:t>
                 </a:r>
-                <a:endParaRPr lang="en-US" sz="1100" b="1" dirty="0">
-                  <a:solidFill>
-                    <a:srgbClr val="00B0F0"/>
-                  </a:solidFill>
-                </a:endParaRPr>
               </a:p>
             </p:txBody>
           </p:sp>
@@ -5551,6 +5547,613 @@
 </p:sld>
 </file>
 
+<file path=ppt/slides/slide4.xml><?xml version="1.0" encoding="utf-8"?>
+<p:sld xmlns:a="http://schemas.openxmlformats.org/drawingml/2006/main" xmlns:r="http://schemas.openxmlformats.org/officeDocument/2006/relationships" xmlns:p="http://schemas.openxmlformats.org/presentationml/2006/main">
+  <p:cSld>
+    <p:spTree>
+      <p:nvGrpSpPr>
+        <p:cNvPr id="1" name=""/>
+        <p:cNvGrpSpPr/>
+        <p:nvPr/>
+      </p:nvGrpSpPr>
+      <p:grpSpPr>
+        <a:xfrm>
+          <a:off x="0" y="0"/>
+          <a:ext cx="0" cy="0"/>
+          <a:chOff x="0" y="0"/>
+          <a:chExt cx="0" cy="0"/>
+        </a:xfrm>
+      </p:grpSpPr>
+      <p:grpSp>
+        <p:nvGrpSpPr>
+          <p:cNvPr id="22" name="Group 21"/>
+          <p:cNvGrpSpPr/>
+          <p:nvPr/>
+        </p:nvGrpSpPr>
+        <p:grpSpPr>
+          <a:xfrm>
+            <a:off x="0" y="1721234"/>
+            <a:ext cx="9144000" cy="3415529"/>
+            <a:chOff x="0" y="1721234"/>
+            <a:chExt cx="9144000" cy="3415529"/>
+          </a:xfrm>
+        </p:grpSpPr>
+        <p:pic>
+          <p:nvPicPr>
+            <p:cNvPr id="4" name="Picture 3"/>
+            <p:cNvPicPr>
+              <a:picLocks noChangeAspect="1"/>
+            </p:cNvPicPr>
+            <p:nvPr/>
+          </p:nvPicPr>
+          <p:blipFill>
+            <a:blip r:embed="rId2">
+              <a:extLst>
+                <a:ext uri="{28A0092B-C50C-407E-A947-70E740481C1C}">
+                  <a14:useLocalDpi xmlns:a14="http://schemas.microsoft.com/office/drawing/2010/main" val="0"/>
+                </a:ext>
+              </a:extLst>
+            </a:blip>
+            <a:stretch>
+              <a:fillRect/>
+            </a:stretch>
+          </p:blipFill>
+          <p:spPr>
+            <a:xfrm>
+              <a:off x="0" y="1721234"/>
+              <a:ext cx="9144000" cy="3415529"/>
+            </a:xfrm>
+            <a:prstGeom prst="rect">
+              <a:avLst/>
+            </a:prstGeom>
+          </p:spPr>
+        </p:pic>
+        <p:sp>
+          <p:nvSpPr>
+            <p:cNvPr id="5" name="TextBox 4"/>
+            <p:cNvSpPr txBox="1"/>
+            <p:nvPr/>
+          </p:nvSpPr>
+          <p:spPr>
+            <a:xfrm>
+              <a:off x="4191000" y="3352800"/>
+              <a:ext cx="304800" cy="369332"/>
+            </a:xfrm>
+            <a:prstGeom prst="rect">
+              <a:avLst/>
+            </a:prstGeom>
+            <a:noFill/>
+          </p:spPr>
+          <p:txBody>
+            <a:bodyPr wrap="square" rtlCol="0">
+              <a:spAutoFit/>
+            </a:bodyPr>
+            <a:lstStyle/>
+            <a:p>
+              <a:r>
+                <a:rPr lang="en-US" b="1" dirty="0" smtClean="0">
+                  <a:solidFill>
+                    <a:srgbClr val="00B0F0"/>
+                  </a:solidFill>
+                </a:rPr>
+                <a:t>P</a:t>
+              </a:r>
+              <a:endParaRPr lang="en-US" b="1" dirty="0">
+                <a:solidFill>
+                  <a:srgbClr val="00B0F0"/>
+                </a:solidFill>
+              </a:endParaRPr>
+            </a:p>
+          </p:txBody>
+        </p:sp>
+        <p:sp>
+          <p:nvSpPr>
+            <p:cNvPr id="6" name="TextBox 5"/>
+            <p:cNvSpPr txBox="1"/>
+            <p:nvPr/>
+          </p:nvSpPr>
+          <p:spPr>
+            <a:xfrm>
+              <a:off x="533400" y="2438400"/>
+              <a:ext cx="304800" cy="369332"/>
+            </a:xfrm>
+            <a:prstGeom prst="rect">
+              <a:avLst/>
+            </a:prstGeom>
+            <a:noFill/>
+          </p:spPr>
+          <p:txBody>
+            <a:bodyPr wrap="square" rtlCol="0">
+              <a:spAutoFit/>
+            </a:bodyPr>
+            <a:lstStyle/>
+            <a:p>
+              <a:r>
+                <a:rPr lang="en-US" b="1" dirty="0">
+                  <a:solidFill>
+                    <a:srgbClr val="FF0000"/>
+                  </a:solidFill>
+                </a:rPr>
+                <a:t>1</a:t>
+              </a:r>
+              <a:endParaRPr lang="en-US" b="1" dirty="0">
+                <a:solidFill>
+                  <a:srgbClr val="FF0000"/>
+                </a:solidFill>
+              </a:endParaRPr>
+            </a:p>
+          </p:txBody>
+        </p:sp>
+        <p:sp>
+          <p:nvSpPr>
+            <p:cNvPr id="7" name="TextBox 6"/>
+            <p:cNvSpPr txBox="1"/>
+            <p:nvPr/>
+          </p:nvSpPr>
+          <p:spPr>
+            <a:xfrm>
+              <a:off x="6019800" y="2438400"/>
+              <a:ext cx="304800" cy="369332"/>
+            </a:xfrm>
+            <a:prstGeom prst="rect">
+              <a:avLst/>
+            </a:prstGeom>
+            <a:noFill/>
+          </p:spPr>
+          <p:txBody>
+            <a:bodyPr wrap="square" rtlCol="0">
+              <a:spAutoFit/>
+            </a:bodyPr>
+            <a:lstStyle/>
+            <a:p>
+              <a:r>
+                <a:rPr lang="en-US" b="1" dirty="0" smtClean="0">
+                  <a:solidFill>
+                    <a:srgbClr val="FF0000"/>
+                  </a:solidFill>
+                </a:rPr>
+                <a:t>2</a:t>
+              </a:r>
+              <a:endParaRPr lang="en-US" b="1" dirty="0">
+                <a:solidFill>
+                  <a:srgbClr val="FF0000"/>
+                </a:solidFill>
+              </a:endParaRPr>
+            </a:p>
+          </p:txBody>
+        </p:sp>
+        <p:sp>
+          <p:nvSpPr>
+            <p:cNvPr id="8" name="TextBox 7"/>
+            <p:cNvSpPr txBox="1"/>
+            <p:nvPr/>
+          </p:nvSpPr>
+          <p:spPr>
+            <a:xfrm>
+              <a:off x="6477000" y="2438400"/>
+              <a:ext cx="304800" cy="369332"/>
+            </a:xfrm>
+            <a:prstGeom prst="rect">
+              <a:avLst/>
+            </a:prstGeom>
+            <a:noFill/>
+          </p:spPr>
+          <p:txBody>
+            <a:bodyPr wrap="square" rtlCol="0">
+              <a:spAutoFit/>
+            </a:bodyPr>
+            <a:lstStyle/>
+            <a:p>
+              <a:r>
+                <a:rPr lang="en-US" b="1" dirty="0">
+                  <a:solidFill>
+                    <a:srgbClr val="FF0000"/>
+                  </a:solidFill>
+                </a:rPr>
+                <a:t>3</a:t>
+              </a:r>
+              <a:endParaRPr lang="en-US" b="1" dirty="0">
+                <a:solidFill>
+                  <a:srgbClr val="FF0000"/>
+                </a:solidFill>
+              </a:endParaRPr>
+            </a:p>
+          </p:txBody>
+        </p:sp>
+        <p:sp>
+          <p:nvSpPr>
+            <p:cNvPr id="9" name="TextBox 8"/>
+            <p:cNvSpPr txBox="1"/>
+            <p:nvPr/>
+          </p:nvSpPr>
+          <p:spPr>
+            <a:xfrm>
+              <a:off x="533400" y="2895600"/>
+              <a:ext cx="304800" cy="369332"/>
+            </a:xfrm>
+            <a:prstGeom prst="rect">
+              <a:avLst/>
+            </a:prstGeom>
+            <a:noFill/>
+          </p:spPr>
+          <p:txBody>
+            <a:bodyPr wrap="square" rtlCol="0">
+              <a:spAutoFit/>
+            </a:bodyPr>
+            <a:lstStyle/>
+            <a:p>
+              <a:r>
+                <a:rPr lang="en-US" b="1" dirty="0" smtClean="0">
+                  <a:solidFill>
+                    <a:srgbClr val="FF0000"/>
+                  </a:solidFill>
+                </a:rPr>
+                <a:t>4</a:t>
+              </a:r>
+              <a:endParaRPr lang="en-US" b="1" dirty="0">
+                <a:solidFill>
+                  <a:srgbClr val="FF0000"/>
+                </a:solidFill>
+              </a:endParaRPr>
+            </a:p>
+          </p:txBody>
+        </p:sp>
+        <p:sp>
+          <p:nvSpPr>
+            <p:cNvPr id="10" name="TextBox 9"/>
+            <p:cNvSpPr txBox="1"/>
+            <p:nvPr/>
+          </p:nvSpPr>
+          <p:spPr>
+            <a:xfrm>
+              <a:off x="1905000" y="2895600"/>
+              <a:ext cx="304800" cy="369332"/>
+            </a:xfrm>
+            <a:prstGeom prst="rect">
+              <a:avLst/>
+            </a:prstGeom>
+            <a:noFill/>
+          </p:spPr>
+          <p:txBody>
+            <a:bodyPr wrap="square" rtlCol="0">
+              <a:spAutoFit/>
+            </a:bodyPr>
+            <a:lstStyle/>
+            <a:p>
+              <a:r>
+                <a:rPr lang="en-US" b="1" dirty="0" smtClean="0">
+                  <a:solidFill>
+                    <a:srgbClr val="FF0000"/>
+                  </a:solidFill>
+                </a:rPr>
+                <a:t>5</a:t>
+              </a:r>
+              <a:endParaRPr lang="en-US" b="1" dirty="0">
+                <a:solidFill>
+                  <a:srgbClr val="FF0000"/>
+                </a:solidFill>
+              </a:endParaRPr>
+            </a:p>
+          </p:txBody>
+        </p:sp>
+        <p:sp>
+          <p:nvSpPr>
+            <p:cNvPr id="11" name="TextBox 10"/>
+            <p:cNvSpPr txBox="1"/>
+            <p:nvPr/>
+          </p:nvSpPr>
+          <p:spPr>
+            <a:xfrm>
+              <a:off x="3276600" y="2895600"/>
+              <a:ext cx="304800" cy="369332"/>
+            </a:xfrm>
+            <a:prstGeom prst="rect">
+              <a:avLst/>
+            </a:prstGeom>
+            <a:noFill/>
+          </p:spPr>
+          <p:txBody>
+            <a:bodyPr wrap="square" rtlCol="0">
+              <a:spAutoFit/>
+            </a:bodyPr>
+            <a:lstStyle/>
+            <a:p>
+              <a:r>
+                <a:rPr lang="en-US" b="1" dirty="0" smtClean="0">
+                  <a:solidFill>
+                    <a:srgbClr val="FF0000"/>
+                  </a:solidFill>
+                </a:rPr>
+                <a:t>6</a:t>
+              </a:r>
+              <a:endParaRPr lang="en-US" b="1" dirty="0">
+                <a:solidFill>
+                  <a:srgbClr val="FF0000"/>
+                </a:solidFill>
+              </a:endParaRPr>
+            </a:p>
+          </p:txBody>
+        </p:sp>
+        <p:sp>
+          <p:nvSpPr>
+            <p:cNvPr id="12" name="TextBox 11"/>
+            <p:cNvSpPr txBox="1"/>
+            <p:nvPr/>
+          </p:nvSpPr>
+          <p:spPr>
+            <a:xfrm>
+              <a:off x="4648200" y="2895600"/>
+              <a:ext cx="304800" cy="369332"/>
+            </a:xfrm>
+            <a:prstGeom prst="rect">
+              <a:avLst/>
+            </a:prstGeom>
+            <a:noFill/>
+          </p:spPr>
+          <p:txBody>
+            <a:bodyPr wrap="square" rtlCol="0">
+              <a:spAutoFit/>
+            </a:bodyPr>
+            <a:lstStyle/>
+            <a:p>
+              <a:r>
+                <a:rPr lang="en-US" b="1" dirty="0" smtClean="0">
+                  <a:solidFill>
+                    <a:srgbClr val="FF0000"/>
+                  </a:solidFill>
+                </a:rPr>
+                <a:t>7</a:t>
+              </a:r>
+              <a:endParaRPr lang="en-US" b="1" dirty="0">
+                <a:solidFill>
+                  <a:srgbClr val="FF0000"/>
+                </a:solidFill>
+              </a:endParaRPr>
+            </a:p>
+          </p:txBody>
+        </p:sp>
+        <p:sp>
+          <p:nvSpPr>
+            <p:cNvPr id="13" name="TextBox 12"/>
+            <p:cNvSpPr txBox="1"/>
+            <p:nvPr/>
+          </p:nvSpPr>
+          <p:spPr>
+            <a:xfrm>
+              <a:off x="6019800" y="2895600"/>
+              <a:ext cx="304800" cy="369332"/>
+            </a:xfrm>
+            <a:prstGeom prst="rect">
+              <a:avLst/>
+            </a:prstGeom>
+            <a:noFill/>
+          </p:spPr>
+          <p:txBody>
+            <a:bodyPr wrap="square" rtlCol="0">
+              <a:spAutoFit/>
+            </a:bodyPr>
+            <a:lstStyle/>
+            <a:p>
+              <a:r>
+                <a:rPr lang="en-US" b="1" dirty="0" smtClean="0">
+                  <a:solidFill>
+                    <a:srgbClr val="FF0000"/>
+                  </a:solidFill>
+                </a:rPr>
+                <a:t>8</a:t>
+              </a:r>
+              <a:endParaRPr lang="en-US" b="1" dirty="0">
+                <a:solidFill>
+                  <a:srgbClr val="FF0000"/>
+                </a:solidFill>
+              </a:endParaRPr>
+            </a:p>
+          </p:txBody>
+        </p:sp>
+        <p:sp>
+          <p:nvSpPr>
+            <p:cNvPr id="14" name="TextBox 13"/>
+            <p:cNvSpPr txBox="1"/>
+            <p:nvPr/>
+          </p:nvSpPr>
+          <p:spPr>
+            <a:xfrm>
+              <a:off x="533400" y="4257675"/>
+              <a:ext cx="304800" cy="369332"/>
+            </a:xfrm>
+            <a:prstGeom prst="rect">
+              <a:avLst/>
+            </a:prstGeom>
+            <a:noFill/>
+          </p:spPr>
+          <p:txBody>
+            <a:bodyPr wrap="square" rtlCol="0">
+              <a:spAutoFit/>
+            </a:bodyPr>
+            <a:lstStyle/>
+            <a:p>
+              <a:r>
+                <a:rPr lang="en-US" b="1" dirty="0">
+                  <a:solidFill>
+                    <a:srgbClr val="FF0000"/>
+                  </a:solidFill>
+                </a:rPr>
+                <a:t>9</a:t>
+              </a:r>
+              <a:endParaRPr lang="en-US" b="1" dirty="0">
+                <a:solidFill>
+                  <a:srgbClr val="FF0000"/>
+                </a:solidFill>
+              </a:endParaRPr>
+            </a:p>
+          </p:txBody>
+        </p:sp>
+        <p:sp>
+          <p:nvSpPr>
+            <p:cNvPr id="15" name="TextBox 14"/>
+            <p:cNvSpPr txBox="1"/>
+            <p:nvPr/>
+          </p:nvSpPr>
+          <p:spPr>
+            <a:xfrm>
+              <a:off x="971550" y="4257675"/>
+              <a:ext cx="457200" cy="338554"/>
+            </a:xfrm>
+            <a:prstGeom prst="rect">
+              <a:avLst/>
+            </a:prstGeom>
+            <a:noFill/>
+          </p:spPr>
+          <p:txBody>
+            <a:bodyPr wrap="square" rtlCol="0">
+              <a:spAutoFit/>
+            </a:bodyPr>
+            <a:lstStyle/>
+            <a:p>
+              <a:r>
+                <a:rPr lang="en-US" sz="1600" b="1" dirty="0" smtClean="0">
+                  <a:solidFill>
+                    <a:srgbClr val="FF0000"/>
+                  </a:solidFill>
+                </a:rPr>
+                <a:t>10</a:t>
+              </a:r>
+              <a:endParaRPr lang="en-US" sz="1600" b="1" dirty="0">
+                <a:solidFill>
+                  <a:srgbClr val="FF0000"/>
+                </a:solidFill>
+              </a:endParaRPr>
+            </a:p>
+          </p:txBody>
+        </p:sp>
+        <p:sp>
+          <p:nvSpPr>
+            <p:cNvPr id="19" name="TextBox 18"/>
+            <p:cNvSpPr txBox="1"/>
+            <p:nvPr/>
+          </p:nvSpPr>
+          <p:spPr>
+            <a:xfrm>
+              <a:off x="1409700" y="4273064"/>
+              <a:ext cx="457200" cy="338554"/>
+            </a:xfrm>
+            <a:prstGeom prst="rect">
+              <a:avLst/>
+            </a:prstGeom>
+            <a:noFill/>
+          </p:spPr>
+          <p:txBody>
+            <a:bodyPr wrap="square" rtlCol="0">
+              <a:spAutoFit/>
+            </a:bodyPr>
+            <a:lstStyle/>
+            <a:p>
+              <a:r>
+                <a:rPr lang="en-US" sz="1600" b="1" dirty="0" smtClean="0">
+                  <a:solidFill>
+                    <a:srgbClr val="FF0000"/>
+                  </a:solidFill>
+                </a:rPr>
+                <a:t>11</a:t>
+              </a:r>
+              <a:endParaRPr lang="en-US" sz="1600" b="1" dirty="0">
+                <a:solidFill>
+                  <a:srgbClr val="FF0000"/>
+                </a:solidFill>
+              </a:endParaRPr>
+            </a:p>
+          </p:txBody>
+        </p:sp>
+        <p:sp>
+          <p:nvSpPr>
+            <p:cNvPr id="20" name="TextBox 19"/>
+            <p:cNvSpPr txBox="1"/>
+            <p:nvPr/>
+          </p:nvSpPr>
+          <p:spPr>
+            <a:xfrm>
+              <a:off x="1828800" y="4273064"/>
+              <a:ext cx="457200" cy="338554"/>
+            </a:xfrm>
+            <a:prstGeom prst="rect">
+              <a:avLst/>
+            </a:prstGeom>
+            <a:noFill/>
+          </p:spPr>
+          <p:txBody>
+            <a:bodyPr wrap="square" rtlCol="0">
+              <a:spAutoFit/>
+            </a:bodyPr>
+            <a:lstStyle/>
+            <a:p>
+              <a:r>
+                <a:rPr lang="en-US" sz="1600" b="1" dirty="0" smtClean="0">
+                  <a:solidFill>
+                    <a:srgbClr val="FF0000"/>
+                  </a:solidFill>
+                </a:rPr>
+                <a:t>12</a:t>
+              </a:r>
+              <a:endParaRPr lang="en-US" sz="1600" b="1" dirty="0">
+                <a:solidFill>
+                  <a:srgbClr val="FF0000"/>
+                </a:solidFill>
+              </a:endParaRPr>
+            </a:p>
+          </p:txBody>
+        </p:sp>
+        <p:sp>
+          <p:nvSpPr>
+            <p:cNvPr id="21" name="TextBox 20"/>
+            <p:cNvSpPr txBox="1"/>
+            <p:nvPr/>
+          </p:nvSpPr>
+          <p:spPr>
+            <a:xfrm>
+              <a:off x="2295525" y="4273064"/>
+              <a:ext cx="457200" cy="338554"/>
+            </a:xfrm>
+            <a:prstGeom prst="rect">
+              <a:avLst/>
+            </a:prstGeom>
+            <a:noFill/>
+          </p:spPr>
+          <p:txBody>
+            <a:bodyPr wrap="square" rtlCol="0">
+              <a:spAutoFit/>
+            </a:bodyPr>
+            <a:lstStyle/>
+            <a:p>
+              <a:r>
+                <a:rPr lang="en-US" sz="1600" b="1" dirty="0" smtClean="0">
+                  <a:solidFill>
+                    <a:srgbClr val="FF0000"/>
+                  </a:solidFill>
+                </a:rPr>
+                <a:t>13</a:t>
+              </a:r>
+              <a:endParaRPr lang="en-US" sz="1600" b="1" dirty="0">
+                <a:solidFill>
+                  <a:srgbClr val="FF0000"/>
+                </a:solidFill>
+              </a:endParaRPr>
+            </a:p>
+          </p:txBody>
+        </p:sp>
+      </p:grpSp>
+    </p:spTree>
+    <p:extLst>
+      <p:ext uri="{BB962C8B-B14F-4D97-AF65-F5344CB8AC3E}">
+        <p14:creationId xmlns:p14="http://schemas.microsoft.com/office/powerpoint/2010/main" val="1754426118"/>
+      </p:ext>
+    </p:extLst>
+  </p:cSld>
+  <p:clrMapOvr>
+    <a:masterClrMapping/>
+  </p:clrMapOvr>
+</p:sld>
+</file>
+
 <file path=ppt/theme/theme1.xml><?xml version="1.0" encoding="utf-8"?>
 <a:theme xmlns:a="http://schemas.openxmlformats.org/drawingml/2006/main" name="Office Theme">
   <a:themeElements>

</xml_diff>